<commit_message>
Adição de codigo e slides
</commit_message>
<xml_diff>
--- a/Arquivos/2017.08.14-Arquivos.pptx
+++ b/Arquivos/2017.08.14-Arquivos.pptx
@@ -19,6 +19,7 @@
     <p:sldId id="269" r:id="rId13"/>
     <p:sldId id="266" r:id="rId14"/>
     <p:sldId id="267" r:id="rId15"/>
+    <p:sldId id="270" r:id="rId16"/>
   </p:sldIdLst>
   <p:sldSz cx="12190413" cy="6859588"/>
   <p:notesSz cx="6858000" cy="9144000"/>
@@ -370,7 +371,7 @@
           <a:p>
             <a:fld id="{9E0BFD56-3D73-451E-9A87-18740EEBF47F}" type="datetimeFigureOut">
               <a:rPr lang="pt-BR" smtClean="0"/>
-              <a:t>14/08/2017</a:t>
+              <a:t>17/08/2017</a:t>
             </a:fld>
             <a:endParaRPr lang="pt-BR"/>
           </a:p>
@@ -546,7 +547,7 @@
           <a:p>
             <a:fld id="{9E0BFD56-3D73-451E-9A87-18740EEBF47F}" type="datetimeFigureOut">
               <a:rPr lang="pt-BR" smtClean="0"/>
-              <a:t>14/08/2017</a:t>
+              <a:t>17/08/2017</a:t>
             </a:fld>
             <a:endParaRPr lang="pt-BR"/>
           </a:p>
@@ -670,7 +671,7 @@
           <a:p>
             <a:fld id="{9E0BFD56-3D73-451E-9A87-18740EEBF47F}" type="datetimeFigureOut">
               <a:rPr lang="pt-BR" smtClean="0"/>
-              <a:t>14/08/2017</a:t>
+              <a:t>17/08/2017</a:t>
             </a:fld>
             <a:endParaRPr lang="pt-BR"/>
           </a:p>
@@ -760,7 +761,7 @@
           <a:p>
             <a:fld id="{9E0BFD56-3D73-451E-9A87-18740EEBF47F}" type="datetimeFigureOut">
               <a:rPr lang="pt-BR" smtClean="0"/>
-              <a:t>14/08/2017</a:t>
+              <a:t>17/08/2017</a:t>
             </a:fld>
             <a:endParaRPr lang="pt-BR"/>
           </a:p>
@@ -998,7 +999,7 @@
           <a:p>
             <a:fld id="{9E0BFD56-3D73-451E-9A87-18740EEBF47F}" type="datetimeFigureOut">
               <a:rPr lang="pt-BR" smtClean="0"/>
-              <a:t>14/08/2017</a:t>
+              <a:t>17/08/2017</a:t>
             </a:fld>
             <a:endParaRPr lang="pt-BR"/>
           </a:p>
@@ -1174,7 +1175,7 @@
           <a:p>
             <a:fld id="{9E0BFD56-3D73-451E-9A87-18740EEBF47F}" type="datetimeFigureOut">
               <a:rPr lang="pt-BR" smtClean="0"/>
-              <a:t>14/08/2017</a:t>
+              <a:t>17/08/2017</a:t>
             </a:fld>
             <a:endParaRPr lang="pt-BR"/>
           </a:p>
@@ -1412,7 +1413,7 @@
           <a:p>
             <a:fld id="{9E0BFD56-3D73-451E-9A87-18740EEBF47F}" type="datetimeFigureOut">
               <a:rPr lang="pt-BR" smtClean="0"/>
-              <a:t>14/08/2017</a:t>
+              <a:t>17/08/2017</a:t>
             </a:fld>
             <a:endParaRPr lang="pt-BR"/>
           </a:p>
@@ -1681,7 +1682,7 @@
           <a:p>
             <a:fld id="{9E0BFD56-3D73-451E-9A87-18740EEBF47F}" type="datetimeFigureOut">
               <a:rPr lang="pt-BR" smtClean="0"/>
-              <a:t>14/08/2017</a:t>
+              <a:t>17/08/2017</a:t>
             </a:fld>
             <a:endParaRPr lang="pt-BR"/>
           </a:p>
@@ -3014,7 +3015,7 @@
         <p:spPr/>
         <p:txBody>
           <a:bodyPr>
-            <a:normAutofit lnSpcReduction="10000"/>
+            <a:normAutofit/>
           </a:bodyPr>
           <a:lstStyle/>
           <a:p>
@@ -3026,25 +3027,22 @@
           <a:p>
             <a:r>
               <a:rPr lang="pt-BR" dirty="0" smtClean="0"/>
-              <a:t>Ler um arquivo texto e contar quanto de cada vogal existe.</a:t>
-            </a:r>
-          </a:p>
-          <a:p>
-            <a:r>
-              <a:rPr lang="pt-BR" dirty="0"/>
-              <a:t>Escrever um programa que abre o arquivo de notas de alunos, calcula a média com base na nota desses alunos e reescreve o arquivo incluindo as informações da média e a situação (aprovado / reprovado);</a:t>
-            </a:r>
-          </a:p>
-          <a:p>
-            <a:r>
-              <a:rPr lang="pt-BR" dirty="0"/>
-              <a:t>Escrever um programa que recebe um valor inteiro do usuário e gerar essa quantidade de valores aleatórios e guarda esses valores em um arquivo</a:t>
+              <a:t>Ler um arquivo texto e contar quanto de cada vogal existe</a:t>
             </a:r>
             <a:r>
               <a:rPr lang="pt-BR" dirty="0" smtClean="0"/>
               <a:t>.</a:t>
             </a:r>
-            <a:endParaRPr lang="pt-BR" dirty="0"/>
+          </a:p>
+          <a:p>
+            <a:r>
+              <a:rPr lang="pt-BR" dirty="0" smtClean="0"/>
+              <a:t>Ler um arquivo e contar quantas linhas ele tem.</a:t>
+            </a:r>
+            <a:endParaRPr lang="pt-BR" dirty="0" smtClean="0"/>
+          </a:p>
+          <a:p>
+            <a:endParaRPr lang="pt-BR" dirty="0" smtClean="0"/>
           </a:p>
         </p:txBody>
       </p:sp>
@@ -3075,6 +3073,100 @@
     <p:extLst>
       <p:ext uri="{BB962C8B-B14F-4D97-AF65-F5344CB8AC3E}">
         <p14:creationId xmlns:p14="http://schemas.microsoft.com/office/powerpoint/2010/main" val="2686579323"/>
+      </p:ext>
+    </p:extLst>
+  </p:cSld>
+  <p:clrMapOvr>
+    <a:masterClrMapping/>
+  </p:clrMapOvr>
+</p:sld>
+</file>
+
+<file path=ppt/slides/slide15.xml><?xml version="1.0" encoding="utf-8"?>
+<p:sld xmlns:a="http://schemas.openxmlformats.org/drawingml/2006/main" xmlns:r="http://schemas.openxmlformats.org/officeDocument/2006/relationships" xmlns:p="http://schemas.openxmlformats.org/presentationml/2006/main">
+  <p:cSld>
+    <p:spTree>
+      <p:nvGrpSpPr>
+        <p:cNvPr id="1" name=""/>
+        <p:cNvGrpSpPr/>
+        <p:nvPr/>
+      </p:nvGrpSpPr>
+      <p:grpSpPr>
+        <a:xfrm>
+          <a:off x="0" y="0"/>
+          <a:ext cx="0" cy="0"/>
+          <a:chOff x="0" y="0"/>
+          <a:chExt cx="0" cy="0"/>
+        </a:xfrm>
+      </p:grpSpPr>
+      <p:sp>
+        <p:nvSpPr>
+          <p:cNvPr id="2" name="Espaço Reservado para Texto 1"/>
+          <p:cNvSpPr>
+            <a:spLocks noGrp="1"/>
+          </p:cNvSpPr>
+          <p:nvPr>
+            <p:ph type="body" idx="1"/>
+          </p:nvPr>
+        </p:nvSpPr>
+        <p:spPr/>
+        <p:txBody>
+          <a:bodyPr/>
+          <a:lstStyle/>
+          <a:p>
+            <a:r>
+              <a:rPr lang="pt-BR" dirty="0" smtClean="0"/>
+              <a:t>Implementar uma agenda de contatos (Nome, telefone e e-mail) usando listas e salvar essa agenda em um arquivo.</a:t>
+            </a:r>
+          </a:p>
+          <a:p>
+            <a:r>
+              <a:rPr lang="pt-BR" dirty="0" smtClean="0"/>
+              <a:t>Se já existir um arquivo com contatos, carregar esses contatos para o programa;</a:t>
+            </a:r>
+          </a:p>
+          <a:p>
+            <a:r>
+              <a:rPr lang="pt-BR" dirty="0" smtClean="0"/>
+              <a:t>As funcionalidades da agenda devem ser apenas visualizar contatos, buscar contato e adicionar contato.</a:t>
+            </a:r>
+          </a:p>
+          <a:p>
+            <a:r>
+              <a:rPr lang="pt-BR" smtClean="0"/>
+              <a:t>Entrega: 31/08/2017</a:t>
+            </a:r>
+            <a:endParaRPr lang="pt-BR" dirty="0"/>
+          </a:p>
+        </p:txBody>
+      </p:sp>
+      <p:sp>
+        <p:nvSpPr>
+          <p:cNvPr id="3" name="Título 2"/>
+          <p:cNvSpPr>
+            <a:spLocks noGrp="1"/>
+          </p:cNvSpPr>
+          <p:nvPr>
+            <p:ph type="title"/>
+          </p:nvPr>
+        </p:nvSpPr>
+        <p:spPr/>
+        <p:txBody>
+          <a:bodyPr/>
+          <a:lstStyle/>
+          <a:p>
+            <a:r>
+              <a:rPr lang="pt-BR" dirty="0" smtClean="0"/>
+              <a:t>Trabalho</a:t>
+            </a:r>
+            <a:endParaRPr lang="pt-BR" dirty="0"/>
+          </a:p>
+        </p:txBody>
+      </p:sp>
+    </p:spTree>
+    <p:extLst>
+      <p:ext uri="{BB962C8B-B14F-4D97-AF65-F5344CB8AC3E}">
+        <p14:creationId xmlns:p14="http://schemas.microsoft.com/office/powerpoint/2010/main" val="1955950644"/>
       </p:ext>
     </p:extLst>
   </p:cSld>

</xml_diff>